<commit_message>
several months of updates pushed for backup
</commit_message>
<xml_diff>
--- a/data/data_model_diagram_2021.pptx
+++ b/data/data_model_diagram_2021.pptx
@@ -263,7 +263,7 @@
           <a:p>
             <a:fld id="{C886FF9B-E8CD-4AAA-973D-B0D8C7E5E2C6}" type="datetimeFigureOut">
               <a:rPr lang="en-CA" smtClean="0"/>
-              <a:t>2021-04-14</a:t>
+              <a:t>2021-12-14</a:t>
             </a:fld>
             <a:endParaRPr lang="en-CA"/>
           </a:p>
@@ -463,7 +463,7 @@
           <a:p>
             <a:fld id="{C886FF9B-E8CD-4AAA-973D-B0D8C7E5E2C6}" type="datetimeFigureOut">
               <a:rPr lang="en-CA" smtClean="0"/>
-              <a:t>2021-04-14</a:t>
+              <a:t>2021-12-14</a:t>
             </a:fld>
             <a:endParaRPr lang="en-CA"/>
           </a:p>
@@ -673,7 +673,7 @@
           <a:p>
             <a:fld id="{C886FF9B-E8CD-4AAA-973D-B0D8C7E5E2C6}" type="datetimeFigureOut">
               <a:rPr lang="en-CA" smtClean="0"/>
-              <a:t>2021-04-14</a:t>
+              <a:t>2021-12-14</a:t>
             </a:fld>
             <a:endParaRPr lang="en-CA"/>
           </a:p>
@@ -873,7 +873,7 @@
           <a:p>
             <a:fld id="{C886FF9B-E8CD-4AAA-973D-B0D8C7E5E2C6}" type="datetimeFigureOut">
               <a:rPr lang="en-CA" smtClean="0"/>
-              <a:t>2021-04-14</a:t>
+              <a:t>2021-12-14</a:t>
             </a:fld>
             <a:endParaRPr lang="en-CA"/>
           </a:p>
@@ -1149,7 +1149,7 @@
           <a:p>
             <a:fld id="{C886FF9B-E8CD-4AAA-973D-B0D8C7E5E2C6}" type="datetimeFigureOut">
               <a:rPr lang="en-CA" smtClean="0"/>
-              <a:t>2021-04-14</a:t>
+              <a:t>2021-12-14</a:t>
             </a:fld>
             <a:endParaRPr lang="en-CA"/>
           </a:p>
@@ -1417,7 +1417,7 @@
           <a:p>
             <a:fld id="{C886FF9B-E8CD-4AAA-973D-B0D8C7E5E2C6}" type="datetimeFigureOut">
               <a:rPr lang="en-CA" smtClean="0"/>
-              <a:t>2021-04-14</a:t>
+              <a:t>2021-12-14</a:t>
             </a:fld>
             <a:endParaRPr lang="en-CA"/>
           </a:p>
@@ -1832,7 +1832,7 @@
           <a:p>
             <a:fld id="{C886FF9B-E8CD-4AAA-973D-B0D8C7E5E2C6}" type="datetimeFigureOut">
               <a:rPr lang="en-CA" smtClean="0"/>
-              <a:t>2021-04-14</a:t>
+              <a:t>2021-12-14</a:t>
             </a:fld>
             <a:endParaRPr lang="en-CA"/>
           </a:p>
@@ -1974,7 +1974,7 @@
           <a:p>
             <a:fld id="{C886FF9B-E8CD-4AAA-973D-B0D8C7E5E2C6}" type="datetimeFigureOut">
               <a:rPr lang="en-CA" smtClean="0"/>
-              <a:t>2021-04-14</a:t>
+              <a:t>2021-12-14</a:t>
             </a:fld>
             <a:endParaRPr lang="en-CA"/>
           </a:p>
@@ -2087,7 +2087,7 @@
           <a:p>
             <a:fld id="{C886FF9B-E8CD-4AAA-973D-B0D8C7E5E2C6}" type="datetimeFigureOut">
               <a:rPr lang="en-CA" smtClean="0"/>
-              <a:t>2021-04-14</a:t>
+              <a:t>2021-12-14</a:t>
             </a:fld>
             <a:endParaRPr lang="en-CA"/>
           </a:p>
@@ -2400,7 +2400,7 @@
           <a:p>
             <a:fld id="{C886FF9B-E8CD-4AAA-973D-B0D8C7E5E2C6}" type="datetimeFigureOut">
               <a:rPr lang="en-CA" smtClean="0"/>
-              <a:t>2021-04-14</a:t>
+              <a:t>2021-12-14</a:t>
             </a:fld>
             <a:endParaRPr lang="en-CA"/>
           </a:p>
@@ -2689,7 +2689,7 @@
           <a:p>
             <a:fld id="{C886FF9B-E8CD-4AAA-973D-B0D8C7E5E2C6}" type="datetimeFigureOut">
               <a:rPr lang="en-CA" smtClean="0"/>
-              <a:t>2021-04-14</a:t>
+              <a:t>2021-12-14</a:t>
             </a:fld>
             <a:endParaRPr lang="en-CA"/>
           </a:p>
@@ -2932,7 +2932,7 @@
           <a:p>
             <a:fld id="{C886FF9B-E8CD-4AAA-973D-B0D8C7E5E2C6}" type="datetimeFigureOut">
               <a:rPr lang="en-CA" smtClean="0"/>
-              <a:t>2021-04-14</a:t>
+              <a:t>2021-12-14</a:t>
             </a:fld>
             <a:endParaRPr lang="en-CA"/>
           </a:p>
@@ -3764,7 +3764,7 @@
         </p:nvSpPr>
         <p:spPr>
           <a:xfrm>
-            <a:off x="8479723" y="392639"/>
+            <a:off x="8459091" y="416194"/>
             <a:ext cx="3427255" cy="2673396"/>
           </a:xfrm>
           <a:prstGeom prst="rect">
@@ -4032,7 +4032,7 @@
                 <a:latin typeface="Calibri" panose="020F0502020204030204" pitchFamily="34" charset="0"/>
                 <a:cs typeface="Arial" panose="020B0604020202020204" pitchFamily="34" charset="0"/>
               </a:rPr>
-              <a:t>functional groups for the ECOSPACE model groups</a:t>
+              <a:t>functional groups / model groups</a:t>
             </a:r>
             <a:endParaRPr lang="en-CA" sz="1600" dirty="0">
               <a:latin typeface="Arial" panose="020B0604020202020204" pitchFamily="34" charset="0"/>
@@ -4622,8 +4622,8 @@
         </p:nvCxnSpPr>
         <p:spPr>
           <a:xfrm flipH="1" flipV="1">
-            <a:off x="8119081" y="1591476"/>
-            <a:ext cx="11635" cy="2162720"/>
+            <a:off x="8130716" y="1433569"/>
+            <a:ext cx="1" cy="2320627"/>
           </a:xfrm>
           <a:prstGeom prst="line">
             <a:avLst/>
@@ -4661,7 +4661,7 @@
         </p:nvCxnSpPr>
         <p:spPr>
           <a:xfrm>
-            <a:off x="8130717" y="1591476"/>
+            <a:off x="8130716" y="1433569"/>
             <a:ext cx="636353" cy="0"/>
           </a:xfrm>
           <a:prstGeom prst="straightConnector1">
@@ -5035,7 +5035,7 @@
                 <a:latin typeface="Calibri" panose="020F0502020204030204" pitchFamily="34" charset="0"/>
                 <a:cs typeface="Arial" panose="020B0604020202020204" pitchFamily="34" charset="0"/>
               </a:rPr>
-              <a:t>species list for Salish Sea (should include verified TSN codes)</a:t>
+              <a:t>species list (should include verified TSN codes)</a:t>
             </a:r>
             <a:endParaRPr lang="en-CA" sz="1050" dirty="0">
               <a:latin typeface="Arial" panose="020B0604020202020204" pitchFamily="34" charset="0"/>

</xml_diff>